<commit_message>
Added slides for myself and Amani
</commit_message>
<xml_diff>
--- a/Documentation/Pres - Copy.pptx
+++ b/Documentation/Pres - Copy.pptx
@@ -9,6 +9,8 @@
     <p:sldId id="274" r:id="rId3"/>
     <p:sldId id="272" r:id="rId4"/>
     <p:sldId id="273" r:id="rId5"/>
+    <p:sldId id="275" r:id="rId6"/>
+    <p:sldId id="276" r:id="rId7"/>
   </p:sldIdLst>
   <p:sldSz cx="12192000" cy="6858000"/>
   <p:notesSz cx="6858000" cy="9144000"/>
@@ -3850,6 +3852,46 @@
             </a:r>
           </a:p>
           <a:p>
+            <a:r>
+              <a:rPr lang="en-US" dirty="0">
+                <a:solidFill>
+                  <a:schemeClr val="tx1"/>
+                </a:solidFill>
+              </a:rPr>
+              <a:t>Allows for interoperability between implementations</a:t>
+            </a:r>
+          </a:p>
+          <a:p>
+            <a:r>
+              <a:rPr lang="en-US" dirty="0">
+                <a:solidFill>
+                  <a:schemeClr val="tx1"/>
+                </a:solidFill>
+              </a:rPr>
+              <a:t>RFC documents to the Internet Engineering Task Force (IETF) and the Internet Society (ISOC)</a:t>
+            </a:r>
+          </a:p>
+          <a:p>
+            <a:r>
+              <a:rPr lang="en-US" dirty="0">
+                <a:solidFill>
+                  <a:schemeClr val="tx1"/>
+                </a:solidFill>
+              </a:rPr>
+              <a:t>IMAP – RFC 3501 and others (ex RFC 6851 for UID MOVE)</a:t>
+            </a:r>
+          </a:p>
+          <a:p>
+            <a:r>
+              <a:rPr lang="en-US" dirty="0">
+                <a:solidFill>
+                  <a:schemeClr val="tx1"/>
+                </a:solidFill>
+              </a:rPr>
+              <a:t>SMTP – RFC 5320</a:t>
+            </a:r>
+          </a:p>
+          <a:p>
             <a:endParaRPr lang="en-US" dirty="0">
               <a:solidFill>
                 <a:schemeClr val="tx1"/>
@@ -3869,6 +3911,285 @@
     <p:extLst>
       <p:ext uri="{BB962C8B-B14F-4D97-AF65-F5344CB8AC3E}">
         <p14:creationId xmlns:p14="http://schemas.microsoft.com/office/powerpoint/2010/main" val="2053799133"/>
+      </p:ext>
+    </p:extLst>
+  </p:cSld>
+  <p:clrMapOvr>
+    <a:masterClrMapping/>
+  </p:clrMapOvr>
+</p:sld>
+</file>
+
+<file path=ppt/slides/slide5.xml><?xml version="1.0" encoding="utf-8"?>
+<p:sld xmlns:a="http://schemas.openxmlformats.org/drawingml/2006/main" xmlns:r="http://schemas.openxmlformats.org/officeDocument/2006/relationships" xmlns:p="http://schemas.openxmlformats.org/presentationml/2006/main">
+  <p:cSld>
+    <p:spTree>
+      <p:nvGrpSpPr>
+        <p:cNvPr id="1" name=""/>
+        <p:cNvGrpSpPr/>
+        <p:nvPr/>
+      </p:nvGrpSpPr>
+      <p:grpSpPr>
+        <a:xfrm>
+          <a:off x="0" y="0"/>
+          <a:ext cx="0" cy="0"/>
+          <a:chOff x="0" y="0"/>
+          <a:chExt cx="0" cy="0"/>
+        </a:xfrm>
+      </p:grpSpPr>
+      <p:sp>
+        <p:nvSpPr>
+          <p:cNvPr id="2" name="Title 1"/>
+          <p:cNvSpPr>
+            <a:spLocks noGrp="1"/>
+          </p:cNvSpPr>
+          <p:nvPr>
+            <p:ph type="title"/>
+          </p:nvPr>
+        </p:nvSpPr>
+        <p:spPr/>
+        <p:txBody>
+          <a:bodyPr/>
+          <a:lstStyle/>
+          <a:p>
+            <a:r>
+              <a:rPr lang="en-US" dirty="0"/>
+              <a:t>IMAP</a:t>
+            </a:r>
+          </a:p>
+        </p:txBody>
+      </p:sp>
+      <p:sp>
+        <p:nvSpPr>
+          <p:cNvPr id="3" name="Content Placeholder 2"/>
+          <p:cNvSpPr>
+            <a:spLocks noGrp="1"/>
+          </p:cNvSpPr>
+          <p:nvPr>
+            <p:ph idx="1"/>
+          </p:nvPr>
+        </p:nvSpPr>
+        <p:spPr/>
+        <p:txBody>
+          <a:bodyPr/>
+          <a:lstStyle/>
+          <a:p>
+            <a:r>
+              <a:rPr lang="en-US" dirty="0">
+                <a:solidFill>
+                  <a:schemeClr val="tx1"/>
+                </a:solidFill>
+              </a:rPr>
+              <a:t>Listing and retrieving emails</a:t>
+            </a:r>
+          </a:p>
+          <a:p>
+            <a:r>
+              <a:rPr lang="en-US" dirty="0">
+                <a:solidFill>
+                  <a:schemeClr val="tx1"/>
+                </a:solidFill>
+              </a:rPr>
+              <a:t>Deleting and moving emails</a:t>
+            </a:r>
+          </a:p>
+          <a:p>
+            <a:r>
+              <a:rPr lang="en-US" dirty="0">
+                <a:solidFill>
+                  <a:schemeClr val="tx1"/>
+                </a:solidFill>
+              </a:rPr>
+              <a:t>Creating, deleting, and renaming folders</a:t>
+            </a:r>
+          </a:p>
+          <a:p>
+            <a:endParaRPr lang="en-US" dirty="0">
+              <a:solidFill>
+                <a:schemeClr val="tx1"/>
+              </a:solidFill>
+            </a:endParaRPr>
+          </a:p>
+          <a:p>
+            <a:endParaRPr lang="en-US" dirty="0">
+              <a:solidFill>
+                <a:schemeClr val="tx1"/>
+              </a:solidFill>
+            </a:endParaRPr>
+          </a:p>
+        </p:txBody>
+      </p:sp>
+      <p:pic>
+        <p:nvPicPr>
+          <p:cNvPr id="5" name="Picture 4"/>
+          <p:cNvPicPr>
+            <a:picLocks noChangeAspect="1"/>
+          </p:cNvPicPr>
+          <p:nvPr/>
+        </p:nvPicPr>
+        <p:blipFill>
+          <a:blip r:embed="rId2">
+            <a:extLst>
+              <a:ext uri="{28A0092B-C50C-407E-A947-70E740481C1C}">
+                <a14:useLocalDpi xmlns:a14="http://schemas.microsoft.com/office/drawing/2010/main" val="0"/>
+              </a:ext>
+            </a:extLst>
+          </a:blip>
+          <a:stretch>
+            <a:fillRect/>
+          </a:stretch>
+        </p:blipFill>
+        <p:spPr>
+          <a:xfrm>
+            <a:off x="6379412" y="1118321"/>
+            <a:ext cx="3057525" cy="5286375"/>
+          </a:xfrm>
+          <a:prstGeom prst="rect">
+            <a:avLst/>
+          </a:prstGeom>
+        </p:spPr>
+      </p:pic>
+    </p:spTree>
+    <p:extLst>
+      <p:ext uri="{BB962C8B-B14F-4D97-AF65-F5344CB8AC3E}">
+        <p14:creationId xmlns:p14="http://schemas.microsoft.com/office/powerpoint/2010/main" val="4112849596"/>
+      </p:ext>
+    </p:extLst>
+  </p:cSld>
+  <p:clrMapOvr>
+    <a:masterClrMapping/>
+  </p:clrMapOvr>
+</p:sld>
+</file>
+
+<file path=ppt/slides/slide6.xml><?xml version="1.0" encoding="utf-8"?>
+<p:sld xmlns:a="http://schemas.openxmlformats.org/drawingml/2006/main" xmlns:r="http://schemas.openxmlformats.org/officeDocument/2006/relationships" xmlns:p="http://schemas.openxmlformats.org/presentationml/2006/main">
+  <p:cSld>
+    <p:spTree>
+      <p:nvGrpSpPr>
+        <p:cNvPr id="1" name=""/>
+        <p:cNvGrpSpPr/>
+        <p:nvPr/>
+      </p:nvGrpSpPr>
+      <p:grpSpPr>
+        <a:xfrm>
+          <a:off x="0" y="0"/>
+          <a:ext cx="0" cy="0"/>
+          <a:chOff x="0" y="0"/>
+          <a:chExt cx="0" cy="0"/>
+        </a:xfrm>
+      </p:grpSpPr>
+      <p:sp>
+        <p:nvSpPr>
+          <p:cNvPr id="2" name="Title 1"/>
+          <p:cNvSpPr>
+            <a:spLocks noGrp="1"/>
+          </p:cNvSpPr>
+          <p:nvPr>
+            <p:ph type="title"/>
+          </p:nvPr>
+        </p:nvSpPr>
+        <p:spPr/>
+        <p:txBody>
+          <a:bodyPr/>
+          <a:lstStyle/>
+          <a:p>
+            <a:r>
+              <a:rPr lang="en-US" dirty="0"/>
+              <a:t>SMTP</a:t>
+            </a:r>
+          </a:p>
+        </p:txBody>
+      </p:sp>
+      <p:sp>
+        <p:nvSpPr>
+          <p:cNvPr id="3" name="Content Placeholder 2"/>
+          <p:cNvSpPr>
+            <a:spLocks noGrp="1"/>
+          </p:cNvSpPr>
+          <p:nvPr>
+            <p:ph idx="1"/>
+          </p:nvPr>
+        </p:nvSpPr>
+        <p:spPr>
+          <a:xfrm>
+            <a:off x="1261872" y="1828800"/>
+            <a:ext cx="2944368" cy="4351337"/>
+          </a:xfrm>
+        </p:spPr>
+        <p:txBody>
+          <a:bodyPr/>
+          <a:lstStyle/>
+          <a:p>
+            <a:r>
+              <a:rPr lang="en-US" dirty="0">
+                <a:solidFill>
+                  <a:schemeClr val="tx1"/>
+                </a:solidFill>
+              </a:rPr>
+              <a:t>Used for sending and receiving emails</a:t>
+            </a:r>
+          </a:p>
+          <a:p>
+            <a:r>
+              <a:rPr lang="en-US" dirty="0">
+                <a:solidFill>
+                  <a:schemeClr val="tx1"/>
+                </a:solidFill>
+              </a:rPr>
+              <a:t>Often used by mail servers to communicate to other mail servers, not just clients.</a:t>
+            </a:r>
+          </a:p>
+          <a:p>
+            <a:endParaRPr lang="en-US" dirty="0">
+              <a:solidFill>
+                <a:schemeClr val="tx1"/>
+              </a:solidFill>
+            </a:endParaRPr>
+          </a:p>
+          <a:p>
+            <a:endParaRPr lang="en-US" dirty="0">
+              <a:solidFill>
+                <a:schemeClr val="tx1"/>
+              </a:solidFill>
+            </a:endParaRPr>
+          </a:p>
+        </p:txBody>
+      </p:sp>
+      <p:pic>
+        <p:nvPicPr>
+          <p:cNvPr id="5" name="Picture 4"/>
+          <p:cNvPicPr>
+            <a:picLocks noChangeAspect="1"/>
+          </p:cNvPicPr>
+          <p:nvPr/>
+        </p:nvPicPr>
+        <p:blipFill>
+          <a:blip r:embed="rId2">
+            <a:extLst>
+              <a:ext uri="{28A0092B-C50C-407E-A947-70E740481C1C}">
+                <a14:useLocalDpi xmlns:a14="http://schemas.microsoft.com/office/drawing/2010/main" val="0"/>
+              </a:ext>
+            </a:extLst>
+          </a:blip>
+          <a:stretch>
+            <a:fillRect/>
+          </a:stretch>
+        </p:blipFill>
+        <p:spPr>
+          <a:xfrm>
+            <a:off x="6108192" y="1230111"/>
+            <a:ext cx="3057525" cy="5162550"/>
+          </a:xfrm>
+          <a:prstGeom prst="rect">
+            <a:avLst/>
+          </a:prstGeom>
+        </p:spPr>
+      </p:pic>
+    </p:spTree>
+    <p:extLst>
+      <p:ext uri="{BB962C8B-B14F-4D97-AF65-F5344CB8AC3E}">
+        <p14:creationId xmlns:p14="http://schemas.microsoft.com/office/powerpoint/2010/main" val="245651956"/>
       </p:ext>
     </p:extLst>
   </p:cSld>

</xml_diff>